<commit_message>
Completed LaTeX template with different kind of slides
</commit_message>
<xml_diff>
--- a/Presentation/Figures/BackgroundImage.pptx
+++ b/Presentation/Figures/BackgroundImage.pptx
@@ -243,7 +243,7 @@
           <a:p>
             <a:fld id="{DA03FDF4-CBA5-2D4B-A003-6AD5C5D6FD5A}" type="datetimeFigureOut">
               <a:rPr lang="en-CH" smtClean="0"/>
-              <a:t>02.11.21</a:t>
+              <a:t>09.11.21</a:t>
             </a:fld>
             <a:endParaRPr lang="en-CH"/>
           </a:p>
@@ -413,7 +413,7 @@
           <a:p>
             <a:fld id="{DA03FDF4-CBA5-2D4B-A003-6AD5C5D6FD5A}" type="datetimeFigureOut">
               <a:rPr lang="en-CH" smtClean="0"/>
-              <a:t>02.11.21</a:t>
+              <a:t>09.11.21</a:t>
             </a:fld>
             <a:endParaRPr lang="en-CH"/>
           </a:p>
@@ -593,7 +593,7 @@
           <a:p>
             <a:fld id="{DA03FDF4-CBA5-2D4B-A003-6AD5C5D6FD5A}" type="datetimeFigureOut">
               <a:rPr lang="en-CH" smtClean="0"/>
-              <a:t>02.11.21</a:t>
+              <a:t>09.11.21</a:t>
             </a:fld>
             <a:endParaRPr lang="en-CH"/>
           </a:p>
@@ -763,7 +763,7 @@
           <a:p>
             <a:fld id="{DA03FDF4-CBA5-2D4B-A003-6AD5C5D6FD5A}" type="datetimeFigureOut">
               <a:rPr lang="en-CH" smtClean="0"/>
-              <a:t>02.11.21</a:t>
+              <a:t>09.11.21</a:t>
             </a:fld>
             <a:endParaRPr lang="en-CH"/>
           </a:p>
@@ -1009,7 +1009,7 @@
           <a:p>
             <a:fld id="{DA03FDF4-CBA5-2D4B-A003-6AD5C5D6FD5A}" type="datetimeFigureOut">
               <a:rPr lang="en-CH" smtClean="0"/>
-              <a:t>02.11.21</a:t>
+              <a:t>09.11.21</a:t>
             </a:fld>
             <a:endParaRPr lang="en-CH"/>
           </a:p>
@@ -1241,7 +1241,7 @@
           <a:p>
             <a:fld id="{DA03FDF4-CBA5-2D4B-A003-6AD5C5D6FD5A}" type="datetimeFigureOut">
               <a:rPr lang="en-CH" smtClean="0"/>
-              <a:t>02.11.21</a:t>
+              <a:t>09.11.21</a:t>
             </a:fld>
             <a:endParaRPr lang="en-CH"/>
           </a:p>
@@ -1608,7 +1608,7 @@
           <a:p>
             <a:fld id="{DA03FDF4-CBA5-2D4B-A003-6AD5C5D6FD5A}" type="datetimeFigureOut">
               <a:rPr lang="en-CH" smtClean="0"/>
-              <a:t>02.11.21</a:t>
+              <a:t>09.11.21</a:t>
             </a:fld>
             <a:endParaRPr lang="en-CH"/>
           </a:p>
@@ -1726,7 +1726,7 @@
           <a:p>
             <a:fld id="{DA03FDF4-CBA5-2D4B-A003-6AD5C5D6FD5A}" type="datetimeFigureOut">
               <a:rPr lang="en-CH" smtClean="0"/>
-              <a:t>02.11.21</a:t>
+              <a:t>09.11.21</a:t>
             </a:fld>
             <a:endParaRPr lang="en-CH"/>
           </a:p>
@@ -1821,7 +1821,7 @@
           <a:p>
             <a:fld id="{DA03FDF4-CBA5-2D4B-A003-6AD5C5D6FD5A}" type="datetimeFigureOut">
               <a:rPr lang="en-CH" smtClean="0"/>
-              <a:t>02.11.21</a:t>
+              <a:t>09.11.21</a:t>
             </a:fld>
             <a:endParaRPr lang="en-CH"/>
           </a:p>
@@ -2098,7 +2098,7 @@
           <a:p>
             <a:fld id="{DA03FDF4-CBA5-2D4B-A003-6AD5C5D6FD5A}" type="datetimeFigureOut">
               <a:rPr lang="en-CH" smtClean="0"/>
-              <a:t>02.11.21</a:t>
+              <a:t>09.11.21</a:t>
             </a:fld>
             <a:endParaRPr lang="en-CH"/>
           </a:p>
@@ -2355,7 +2355,7 @@
           <a:p>
             <a:fld id="{DA03FDF4-CBA5-2D4B-A003-6AD5C5D6FD5A}" type="datetimeFigureOut">
               <a:rPr lang="en-CH" smtClean="0"/>
-              <a:t>02.11.21</a:t>
+              <a:t>09.11.21</a:t>
             </a:fld>
             <a:endParaRPr lang="en-CH"/>
           </a:p>
@@ -2568,7 +2568,7 @@
           <a:p>
             <a:fld id="{DA03FDF4-CBA5-2D4B-A003-6AD5C5D6FD5A}" type="datetimeFigureOut">
               <a:rPr lang="en-CH" smtClean="0"/>
-              <a:t>02.11.21</a:t>
+              <a:t>09.11.21</a:t>
             </a:fld>
             <a:endParaRPr lang="en-CH"/>
           </a:p>
@@ -2975,10 +2975,10 @@
       </p:grpSpPr>
       <p:pic>
         <p:nvPicPr>
-          <p:cNvPr id="5" name="Picture 4" descr="Logo, company name&#10;&#10;Description automatically generated">
+          <p:cNvPr id="3" name="Picture 2" descr="Chart, bar chart, histogram&#10;&#10;Description automatically generated">
             <a:extLst>
               <a:ext uri="{FF2B5EF4-FFF2-40B4-BE49-F238E27FC236}">
-                <a16:creationId xmlns:a16="http://schemas.microsoft.com/office/drawing/2014/main" id="{6381E4D4-8C0D-AA45-9565-0D533847FCFE}"/>
+                <a16:creationId xmlns:a16="http://schemas.microsoft.com/office/drawing/2014/main" id="{F864BDD2-FCFF-F74F-9663-117A093F8439}"/>
               </a:ext>
             </a:extLst>
           </p:cNvPr>
@@ -2995,8 +2995,8 @@
         </p:blipFill>
         <p:spPr>
           <a:xfrm>
-            <a:off x="8863752" y="348180"/>
-            <a:ext cx="2933700" cy="685800"/>
+            <a:off x="5166328" y="4929963"/>
+            <a:ext cx="2180404" cy="1630660"/>
           </a:xfrm>
           <a:prstGeom prst="rect">
             <a:avLst/>
@@ -3005,10 +3005,10 @@
       </p:pic>
       <p:pic>
         <p:nvPicPr>
-          <p:cNvPr id="7" name="Picture 6" descr="Graphical user interface, logo&#10;&#10;Description automatically generated">
+          <p:cNvPr id="6" name="Picture 5" descr="Chart, line chart&#10;&#10;Description automatically generated">
             <a:extLst>
               <a:ext uri="{FF2B5EF4-FFF2-40B4-BE49-F238E27FC236}">
-                <a16:creationId xmlns:a16="http://schemas.microsoft.com/office/drawing/2014/main" id="{331C00A6-4F0F-C245-AB5C-9A44A225C245}"/>
+                <a16:creationId xmlns:a16="http://schemas.microsoft.com/office/drawing/2014/main" id="{9F1B0173-9102-2E41-86AA-AE44704E92B0}"/>
               </a:ext>
             </a:extLst>
           </p:cNvPr>
@@ -3025,8 +3025,8 @@
         </p:blipFill>
         <p:spPr>
           <a:xfrm>
-            <a:off x="394548" y="307440"/>
-            <a:ext cx="2294237" cy="898576"/>
+            <a:off x="0" y="4519448"/>
+            <a:ext cx="2974954" cy="2258522"/>
           </a:xfrm>
           <a:prstGeom prst="rect">
             <a:avLst/>
@@ -3035,39 +3035,10 @@
       </p:pic>
       <p:pic>
         <p:nvPicPr>
-          <p:cNvPr id="11" name="Picture 10" descr="Text&#10;&#10;Description automatically generated with low confidence">
+          <p:cNvPr id="9" name="Picture 8" descr="Chart, line chart&#10;&#10;Description automatically generated">
             <a:extLst>
               <a:ext uri="{FF2B5EF4-FFF2-40B4-BE49-F238E27FC236}">
-                <a16:creationId xmlns:a16="http://schemas.microsoft.com/office/drawing/2014/main" id="{CA35E924-4B9A-E948-A5CB-0544EA6D014B}"/>
-              </a:ext>
-            </a:extLst>
-          </p:cNvPr>
-          <p:cNvPicPr>
-            <a:picLocks noChangeAspect="1"/>
-          </p:cNvPicPr>
-          <p:nvPr/>
-        </p:nvPicPr>
-        <p:blipFill rotWithShape="1">
-          <a:blip r:embed="rId4"/>
-          <a:srcRect l="12288" t="9678" r="19712" b="15646"/>
-          <a:stretch/>
-        </p:blipFill>
-        <p:spPr>
-          <a:xfrm>
-            <a:off x="5175516" y="0"/>
-            <a:ext cx="1605832" cy="1371600"/>
-          </a:xfrm>
-          <a:prstGeom prst="rect">
-            <a:avLst/>
-          </a:prstGeom>
-        </p:spPr>
-      </p:pic>
-      <p:pic>
-        <p:nvPicPr>
-          <p:cNvPr id="13" name="Picture 12" descr="Chart, surface chart&#10;&#10;Description automatically generated">
-            <a:extLst>
-              <a:ext uri="{FF2B5EF4-FFF2-40B4-BE49-F238E27FC236}">
-                <a16:creationId xmlns:a16="http://schemas.microsoft.com/office/drawing/2014/main" id="{2C662EF6-A424-CF40-9A6E-00ED54AE2479}"/>
+                <a16:creationId xmlns:a16="http://schemas.microsoft.com/office/drawing/2014/main" id="{BAAD0D3E-1629-6F47-90CB-4662B70D5360}"/>
               </a:ext>
             </a:extLst>
           </p:cNvPr>
@@ -3077,15 +3048,15 @@
           <p:nvPr/>
         </p:nvPicPr>
         <p:blipFill>
-          <a:blip r:embed="rId5"/>
+          <a:blip r:embed="rId4"/>
           <a:stretch>
             <a:fillRect/>
           </a:stretch>
         </p:blipFill>
         <p:spPr>
           <a:xfrm>
-            <a:off x="836646" y="4773865"/>
-            <a:ext cx="3242230" cy="1950037"/>
+            <a:off x="9206397" y="4519448"/>
+            <a:ext cx="2985603" cy="2338552"/>
           </a:xfrm>
           <a:prstGeom prst="rect">
             <a:avLst/>
@@ -3094,10 +3065,57 @@
       </p:pic>
       <p:pic>
         <p:nvPicPr>
-          <p:cNvPr id="18" name="Picture 17">
+          <p:cNvPr id="1026" name="Picture 2">
             <a:extLst>
               <a:ext uri="{FF2B5EF4-FFF2-40B4-BE49-F238E27FC236}">
-                <a16:creationId xmlns:a16="http://schemas.microsoft.com/office/drawing/2014/main" id="{29CCC31D-1E34-B84F-8461-8731FDAD86EB}"/>
+                <a16:creationId xmlns:a16="http://schemas.microsoft.com/office/drawing/2014/main" id="{C7939641-321A-1A45-9190-C05E868640A4}"/>
+              </a:ext>
+            </a:extLst>
+          </p:cNvPr>
+          <p:cNvPicPr>
+            <a:picLocks noChangeAspect="1" noChangeArrowheads="1"/>
+          </p:cNvPicPr>
+          <p:nvPr/>
+        </p:nvPicPr>
+        <p:blipFill>
+          <a:blip r:embed="rId5">
+            <a:extLst>
+              <a:ext uri="{28A0092B-C50C-407E-A947-70E740481C1C}">
+                <a14:useLocalDpi xmlns:a14="http://schemas.microsoft.com/office/drawing/2010/main" val="0"/>
+              </a:ext>
+            </a:extLst>
+          </a:blip>
+          <a:srcRect/>
+          <a:stretch>
+            <a:fillRect/>
+          </a:stretch>
+        </p:blipFill>
+        <p:spPr bwMode="auto">
+          <a:xfrm>
+            <a:off x="153505" y="196281"/>
+            <a:ext cx="3632603" cy="608461"/>
+          </a:xfrm>
+          <a:prstGeom prst="rect">
+            <a:avLst/>
+          </a:prstGeom>
+          <a:noFill/>
+          <a:extLst>
+            <a:ext uri="{909E8E84-426E-40DD-AFC4-6F175D3DCCD1}">
+              <a14:hiddenFill xmlns:a14="http://schemas.microsoft.com/office/drawing/2010/main">
+                <a:solidFill>
+                  <a:srgbClr val="FFFFFF"/>
+                </a:solidFill>
+              </a14:hiddenFill>
+            </a:ext>
+          </a:extLst>
+        </p:spPr>
+      </p:pic>
+      <p:pic>
+        <p:nvPicPr>
+          <p:cNvPr id="16" name="Picture 15" descr="A picture containing text&#10;&#10;Description automatically generated">
+            <a:extLst>
+              <a:ext uri="{FF2B5EF4-FFF2-40B4-BE49-F238E27FC236}">
+                <a16:creationId xmlns:a16="http://schemas.microsoft.com/office/drawing/2014/main" id="{155C8A08-CBE1-894A-8C4D-C6C9AFE0A297}"/>
               </a:ext>
             </a:extLst>
           </p:cNvPr>
@@ -3114,169 +3132,8 @@
         </p:blipFill>
         <p:spPr>
           <a:xfrm>
-            <a:off x="2872441" y="2473681"/>
-            <a:ext cx="1206435" cy="1137495"/>
-          </a:xfrm>
-          <a:prstGeom prst="rect">
-            <a:avLst/>
-          </a:prstGeom>
-        </p:spPr>
-      </p:pic>
-      <p:pic>
-        <p:nvPicPr>
-          <p:cNvPr id="21" name="Picture 20" descr="A person wearing glasses&#10;&#10;Description automatically generated with medium confidence">
-            <a:extLst>
-              <a:ext uri="{FF2B5EF4-FFF2-40B4-BE49-F238E27FC236}">
-                <a16:creationId xmlns:a16="http://schemas.microsoft.com/office/drawing/2014/main" id="{484D3658-71C0-B849-A9C6-22653CC259B5}"/>
-              </a:ext>
-            </a:extLst>
-          </p:cNvPr>
-          <p:cNvPicPr>
-            <a:picLocks noChangeAspect="1"/>
-          </p:cNvPicPr>
-          <p:nvPr/>
-        </p:nvPicPr>
-        <p:blipFill>
-          <a:blip r:embed="rId7">
-            <a:extLst>
-              <a:ext uri="{28A0092B-C50C-407E-A947-70E740481C1C}">
-                <a14:useLocalDpi xmlns:a14="http://schemas.microsoft.com/office/drawing/2010/main" val="0"/>
-              </a:ext>
-            </a:extLst>
-          </a:blip>
-          <a:stretch>
-            <a:fillRect/>
-          </a:stretch>
-        </p:blipFill>
-        <p:spPr>
-          <a:xfrm>
-            <a:off x="7799037" y="2413171"/>
-            <a:ext cx="1374769" cy="1191975"/>
-          </a:xfrm>
-          <a:prstGeom prst="rect">
-            <a:avLst/>
-          </a:prstGeom>
-        </p:spPr>
-      </p:pic>
-      <p:pic>
-        <p:nvPicPr>
-          <p:cNvPr id="12" name="Picture 11">
-            <a:extLst>
-              <a:ext uri="{FF2B5EF4-FFF2-40B4-BE49-F238E27FC236}">
-                <a16:creationId xmlns:a16="http://schemas.microsoft.com/office/drawing/2014/main" id="{520F6951-5DD9-734D-8DE4-8E2B331433A4}"/>
-              </a:ext>
-            </a:extLst>
-          </p:cNvPr>
-          <p:cNvPicPr>
-            <a:picLocks noChangeAspect="1"/>
-          </p:cNvPicPr>
-          <p:nvPr/>
-        </p:nvPicPr>
-        <p:blipFill>
-          <a:blip r:embed="rId8"/>
-          <a:stretch>
-            <a:fillRect/>
-          </a:stretch>
-        </p:blipFill>
-        <p:spPr>
-          <a:xfrm>
-            <a:off x="4473033" y="2471029"/>
-            <a:ext cx="1248895" cy="1121055"/>
-          </a:xfrm>
-          <a:prstGeom prst="rect">
-            <a:avLst/>
-          </a:prstGeom>
-        </p:spPr>
-      </p:pic>
-      <p:pic>
-        <p:nvPicPr>
-          <p:cNvPr id="14" name="Picture 13" descr="A person smiling for the picture&#10;&#10;Description automatically generated with low confidence">
-            <a:extLst>
-              <a:ext uri="{FF2B5EF4-FFF2-40B4-BE49-F238E27FC236}">
-                <a16:creationId xmlns:a16="http://schemas.microsoft.com/office/drawing/2014/main" id="{358E3019-5AA9-F443-8635-7AC2DF4D9D79}"/>
-              </a:ext>
-            </a:extLst>
-          </p:cNvPr>
-          <p:cNvPicPr>
-            <a:picLocks noChangeAspect="1"/>
-          </p:cNvPicPr>
-          <p:nvPr/>
-        </p:nvPicPr>
-        <p:blipFill>
-          <a:blip r:embed="rId9">
-            <a:extLst>
-              <a:ext uri="{28A0092B-C50C-407E-A947-70E740481C1C}">
-                <a14:useLocalDpi xmlns:a14="http://schemas.microsoft.com/office/drawing/2010/main" val="0"/>
-              </a:ext>
-            </a:extLst>
-          </a:blip>
-          <a:stretch>
-            <a:fillRect/>
-          </a:stretch>
-        </p:blipFill>
-        <p:spPr>
-          <a:xfrm>
-            <a:off x="6139971" y="2413171"/>
-            <a:ext cx="1282755" cy="1191975"/>
-          </a:xfrm>
-          <a:prstGeom prst="rect">
-            <a:avLst/>
-          </a:prstGeom>
-        </p:spPr>
-      </p:pic>
-      <p:pic>
-        <p:nvPicPr>
-          <p:cNvPr id="15" name="Picture 14" descr="Chart, surface chart&#10;&#10;Description automatically generated">
-            <a:extLst>
-              <a:ext uri="{FF2B5EF4-FFF2-40B4-BE49-F238E27FC236}">
-                <a16:creationId xmlns:a16="http://schemas.microsoft.com/office/drawing/2014/main" id="{58D3C6BF-552A-6A41-9025-157FB727EDDA}"/>
-              </a:ext>
-            </a:extLst>
-          </p:cNvPr>
-          <p:cNvPicPr>
-            <a:picLocks noChangeAspect="1"/>
-          </p:cNvPicPr>
-          <p:nvPr/>
-        </p:nvPicPr>
-        <p:blipFill>
-          <a:blip r:embed="rId10"/>
-          <a:stretch>
-            <a:fillRect/>
-          </a:stretch>
-        </p:blipFill>
-        <p:spPr>
-          <a:xfrm>
-            <a:off x="7915545" y="4746008"/>
-            <a:ext cx="3805802" cy="1977893"/>
-          </a:xfrm>
-          <a:prstGeom prst="rect">
-            <a:avLst/>
-          </a:prstGeom>
-        </p:spPr>
-      </p:pic>
-      <p:pic>
-        <p:nvPicPr>
-          <p:cNvPr id="17" name="Picture 16" descr="Chart, line chart&#10;&#10;Description automatically generated">
-            <a:extLst>
-              <a:ext uri="{FF2B5EF4-FFF2-40B4-BE49-F238E27FC236}">
-                <a16:creationId xmlns:a16="http://schemas.microsoft.com/office/drawing/2014/main" id="{121854B1-66D5-6A4B-9BBC-1A07BEC2FD1F}"/>
-              </a:ext>
-            </a:extLst>
-          </p:cNvPr>
-          <p:cNvPicPr>
-            <a:picLocks noChangeAspect="1"/>
-          </p:cNvPicPr>
-          <p:nvPr/>
-        </p:nvPicPr>
-        <p:blipFill rotWithShape="1">
-          <a:blip r:embed="rId11"/>
-          <a:srcRect t="3581"/>
-          <a:stretch/>
-        </p:blipFill>
-        <p:spPr>
-          <a:xfrm>
-            <a:off x="4561115" y="4801721"/>
-            <a:ext cx="2727069" cy="1950037"/>
+            <a:off x="0" y="811267"/>
+            <a:ext cx="4203700" cy="698500"/>
           </a:xfrm>
           <a:prstGeom prst="rect">
             <a:avLst/>

</xml_diff>